<commit_message>
Updated the pptx file with all screenshots amd how to run the apps
</commit_message>
<xml_diff>
--- a/User-Dashboard-MFE.pptx
+++ b/User-Dashboard-MFE.pptx
@@ -11,6 +11,11 @@
     <p:sldId id="258" r:id="rId5"/>
     <p:sldId id="259" r:id="rId6"/>
     <p:sldId id="261" r:id="rId7"/>
+    <p:sldId id="262" r:id="rId8"/>
+    <p:sldId id="263" r:id="rId9"/>
+    <p:sldId id="264" r:id="rId10"/>
+    <p:sldId id="265" r:id="rId11"/>
+    <p:sldId id="266" r:id="rId12"/>
   </p:sldIdLst>
   <p:sldSz cx="12192000" cy="6858000"/>
   <p:notesSz cx="6858000" cy="9144000"/>
@@ -120,7 +125,7 @@
 <file path=ppt/revisionInfo.xml><?xml version="1.0" encoding="utf-8"?>
 <p1510:revInfo xmlns:a="http://schemas.openxmlformats.org/drawingml/2006/main" xmlns:r="http://schemas.openxmlformats.org/officeDocument/2006/relationships" xmlns:p1510="http://schemas.microsoft.com/office/powerpoint/2015/10/main">
   <p1510:revLst>
-    <p1510:client id="{1625D5F3-DDCE-1FDF-5ABF-2B603269BE8E}" v="78" dt="2025-11-10T05:04:25.375"/>
+    <p1510:client id="{1625D5F3-DDCE-1FDF-5ABF-2B603269BE8E}" v="279" dt="2025-11-10T05:32:19.184"/>
     <p1510:client id="{FBBF9802-8D48-4786-8A1E-466268931D3E}" v="339" dt="2025-11-09T11:59:58.043"/>
   </p1510:revLst>
 </p1510:revInfo>
@@ -3736,6 +3741,201 @@
 </p:sld>
 </file>
 
+<file path=ppt/slides/slide10.xml><?xml version="1.0" encoding="utf-8"?>
+<p:sld xmlns:a="http://schemas.openxmlformats.org/drawingml/2006/main" xmlns:r="http://schemas.openxmlformats.org/officeDocument/2006/relationships" xmlns:p="http://schemas.openxmlformats.org/presentationml/2006/main">
+  <p:cSld>
+    <p:spTree>
+      <p:nvGrpSpPr>
+        <p:cNvPr id="1" name=""/>
+        <p:cNvGrpSpPr/>
+        <p:nvPr/>
+      </p:nvGrpSpPr>
+      <p:grpSpPr>
+        <a:xfrm>
+          <a:off x="0" y="0"/>
+          <a:ext cx="0" cy="0"/>
+          <a:chOff x="0" y="0"/>
+          <a:chExt cx="0" cy="0"/>
+        </a:xfrm>
+      </p:grpSpPr>
+      <p:pic>
+        <p:nvPicPr>
+          <p:cNvPr id="4" name="Picture 3" descr="A screenshot of a computer&#10;&#10;AI-generated content may be incorrect.">
+            <a:extLst>
+              <a:ext uri="{FF2B5EF4-FFF2-40B4-BE49-F238E27FC236}">
+                <a16:creationId xmlns:a16="http://schemas.microsoft.com/office/drawing/2014/main" id="{F5DDE76D-0038-150F-3027-15EEE00DD574}"/>
+              </a:ext>
+            </a:extLst>
+          </p:cNvPr>
+          <p:cNvPicPr>
+            <a:picLocks noChangeAspect="1"/>
+          </p:cNvPicPr>
+          <p:nvPr/>
+        </p:nvPicPr>
+        <p:blipFill>
+          <a:blip r:embed="rId2"/>
+          <a:stretch>
+            <a:fillRect/>
+          </a:stretch>
+        </p:blipFill>
+        <p:spPr>
+          <a:xfrm>
+            <a:off x="0" y="789081"/>
+            <a:ext cx="12192000" cy="6064250"/>
+          </a:xfrm>
+          <a:prstGeom prst="rect">
+            <a:avLst/>
+          </a:prstGeom>
+        </p:spPr>
+      </p:pic>
+      <p:sp>
+        <p:nvSpPr>
+          <p:cNvPr id="5" name="TextBox 4">
+            <a:extLst>
+              <a:ext uri="{FF2B5EF4-FFF2-40B4-BE49-F238E27FC236}">
+                <a16:creationId xmlns:a16="http://schemas.microsoft.com/office/drawing/2014/main" id="{6B273F01-16EF-6C94-1041-6668DBC1B17A}"/>
+              </a:ext>
+            </a:extLst>
+          </p:cNvPr>
+          <p:cNvSpPr txBox="1"/>
+          <p:nvPr/>
+        </p:nvSpPr>
+        <p:spPr>
+          <a:xfrm>
+            <a:off x="5039" y="257611"/>
+            <a:ext cx="4043082" cy="369332"/>
+          </a:xfrm>
+          <a:prstGeom prst="rect">
+            <a:avLst/>
+          </a:prstGeom>
+          <a:noFill/>
+        </p:spPr>
+        <p:txBody>
+          <a:bodyPr rot="0" spcFirstLastPara="0" vertOverflow="overflow" horzOverflow="overflow" vert="horz" wrap="square" lIns="91440" tIns="45720" rIns="91440" bIns="45720" numCol="1" spcCol="0" rtlCol="0" fromWordArt="0" anchor="t" anchorCtr="0" forceAA="0" compatLnSpc="1">
+            <a:prstTxWarp prst="textNoShape">
+              <a:avLst/>
+            </a:prstTxWarp>
+            <a:spAutoFit/>
+          </a:bodyPr>
+          <a:lstStyle/>
+          <a:p>
+            <a:r>
+              <a:rPr lang="en-US" dirty="0"/>
+              <a:t>On click of 'User </a:t>
+            </a:r>
+            <a:r>
+              <a:rPr lang="en-US" dirty="0" err="1"/>
+              <a:t>Details'button</a:t>
+            </a:r>
+            <a:endParaRPr lang="en-US" err="1"/>
+          </a:p>
+        </p:txBody>
+      </p:sp>
+    </p:spTree>
+    <p:extLst>
+      <p:ext uri="{BB962C8B-B14F-4D97-AF65-F5344CB8AC3E}">
+        <p14:creationId xmlns:p14="http://schemas.microsoft.com/office/powerpoint/2010/main" val="2352876759"/>
+      </p:ext>
+    </p:extLst>
+  </p:cSld>
+  <p:clrMapOvr>
+    <a:masterClrMapping/>
+  </p:clrMapOvr>
+</p:sld>
+</file>
+
+<file path=ppt/slides/slide11.xml><?xml version="1.0" encoding="utf-8"?>
+<p:sld xmlns:a="http://schemas.openxmlformats.org/drawingml/2006/main" xmlns:r="http://schemas.openxmlformats.org/officeDocument/2006/relationships" xmlns:p="http://schemas.openxmlformats.org/presentationml/2006/main">
+  <p:cSld>
+    <p:spTree>
+      <p:nvGrpSpPr>
+        <p:cNvPr id="1" name=""/>
+        <p:cNvGrpSpPr/>
+        <p:nvPr/>
+      </p:nvGrpSpPr>
+      <p:grpSpPr>
+        <a:xfrm>
+          <a:off x="0" y="0"/>
+          <a:ext cx="0" cy="0"/>
+          <a:chOff x="0" y="0"/>
+          <a:chExt cx="0" cy="0"/>
+        </a:xfrm>
+      </p:grpSpPr>
+      <p:sp>
+        <p:nvSpPr>
+          <p:cNvPr id="2" name="Title 1">
+            <a:extLst>
+              <a:ext uri="{FF2B5EF4-FFF2-40B4-BE49-F238E27FC236}">
+                <a16:creationId xmlns:a16="http://schemas.microsoft.com/office/drawing/2014/main" id="{428061DA-0416-D7EF-65BE-D89BBD04D859}"/>
+              </a:ext>
+            </a:extLst>
+          </p:cNvPr>
+          <p:cNvSpPr>
+            <a:spLocks noGrp="1"/>
+          </p:cNvSpPr>
+          <p:nvPr>
+            <p:ph type="title"/>
+          </p:nvPr>
+        </p:nvSpPr>
+        <p:spPr/>
+        <p:txBody>
+          <a:bodyPr>
+            <a:normAutofit/>
+          </a:bodyPr>
+          <a:lstStyle/>
+          <a:p>
+            <a:r>
+              <a:rPr lang="en-US" sz="1800" dirty="0"/>
+              <a:t>On click of EDIT in 'User Details' section</a:t>
+            </a:r>
+          </a:p>
+        </p:txBody>
+      </p:sp>
+      <p:pic>
+        <p:nvPicPr>
+          <p:cNvPr id="4" name="Content Placeholder 3" descr="A screenshot of a computer&#10;&#10;AI-generated content may be incorrect.">
+            <a:extLst>
+              <a:ext uri="{FF2B5EF4-FFF2-40B4-BE49-F238E27FC236}">
+                <a16:creationId xmlns:a16="http://schemas.microsoft.com/office/drawing/2014/main" id="{CAFEA8A0-9DFB-5E16-145B-DF0FCC503ECC}"/>
+              </a:ext>
+            </a:extLst>
+          </p:cNvPr>
+          <p:cNvPicPr>
+            <a:picLocks noGrp="1" noChangeAspect="1"/>
+          </p:cNvPicPr>
+          <p:nvPr>
+            <p:ph idx="1"/>
+          </p:nvPr>
+        </p:nvPicPr>
+        <p:blipFill>
+          <a:blip r:embed="rId2"/>
+          <a:stretch>
+            <a:fillRect/>
+          </a:stretch>
+        </p:blipFill>
+        <p:spPr>
+          <a:xfrm>
+            <a:off x="1112038" y="1691345"/>
+            <a:ext cx="9198708" cy="4519236"/>
+          </a:xfrm>
+          <a:prstGeom prst="rect">
+            <a:avLst/>
+          </a:prstGeom>
+        </p:spPr>
+      </p:pic>
+    </p:spTree>
+    <p:extLst>
+      <p:ext uri="{BB962C8B-B14F-4D97-AF65-F5344CB8AC3E}">
+        <p14:creationId xmlns:p14="http://schemas.microsoft.com/office/powerpoint/2010/main" val="662155296"/>
+      </p:ext>
+    </p:extLst>
+  </p:cSld>
+  <p:clrMapOvr>
+    <a:masterClrMapping/>
+  </p:clrMapOvr>
+</p:sld>
+</file>
+
 <file path=ppt/slides/slide2.xml><?xml version="1.0" encoding="utf-8"?>
 <p:sld xmlns:a="http://schemas.openxmlformats.org/drawingml/2006/main" xmlns:r="http://schemas.openxmlformats.org/officeDocument/2006/relationships" xmlns:p="http://schemas.openxmlformats.org/presentationml/2006/main">
   <p:cSld>
@@ -5140,6 +5340,704 @@
     <p:extLst>
       <p:ext uri="{BB962C8B-B14F-4D97-AF65-F5344CB8AC3E}">
         <p14:creationId xmlns:p14="http://schemas.microsoft.com/office/powerpoint/2010/main" val="412230992"/>
+      </p:ext>
+    </p:extLst>
+  </p:cSld>
+  <p:clrMapOvr>
+    <a:masterClrMapping/>
+  </p:clrMapOvr>
+</p:sld>
+</file>
+
+<file path=ppt/slides/slide7.xml><?xml version="1.0" encoding="utf-8"?>
+<p:sld xmlns:a="http://schemas.openxmlformats.org/drawingml/2006/main" xmlns:r="http://schemas.openxmlformats.org/officeDocument/2006/relationships" xmlns:p="http://schemas.openxmlformats.org/presentationml/2006/main">
+  <p:cSld>
+    <p:spTree>
+      <p:nvGrpSpPr>
+        <p:cNvPr id="1" name=""/>
+        <p:cNvGrpSpPr/>
+        <p:nvPr/>
+      </p:nvGrpSpPr>
+      <p:grpSpPr>
+        <a:xfrm>
+          <a:off x="0" y="0"/>
+          <a:ext cx="0" cy="0"/>
+          <a:chOff x="0" y="0"/>
+          <a:chExt cx="0" cy="0"/>
+        </a:xfrm>
+      </p:grpSpPr>
+      <p:sp>
+        <p:nvSpPr>
+          <p:cNvPr id="2" name="Title 1">
+            <a:extLst>
+              <a:ext uri="{FF2B5EF4-FFF2-40B4-BE49-F238E27FC236}">
+                <a16:creationId xmlns:a16="http://schemas.microsoft.com/office/drawing/2014/main" id="{228A5157-8F9F-40D4-283B-4AD4958AD84B}"/>
+              </a:ext>
+            </a:extLst>
+          </p:cNvPr>
+          <p:cNvSpPr>
+            <a:spLocks noGrp="1"/>
+          </p:cNvSpPr>
+          <p:nvPr>
+            <p:ph type="title"/>
+          </p:nvPr>
+        </p:nvSpPr>
+        <p:spPr/>
+        <p:txBody>
+          <a:bodyPr/>
+          <a:lstStyle/>
+          <a:p>
+            <a:r>
+              <a:rPr lang="en-US" dirty="0"/>
+              <a:t>How to run?</a:t>
+            </a:r>
+          </a:p>
+        </p:txBody>
+      </p:sp>
+      <p:sp>
+        <p:nvSpPr>
+          <p:cNvPr id="3" name="Content Placeholder 2">
+            <a:extLst>
+              <a:ext uri="{FF2B5EF4-FFF2-40B4-BE49-F238E27FC236}">
+                <a16:creationId xmlns:a16="http://schemas.microsoft.com/office/drawing/2014/main" id="{725E935C-A395-902B-297B-66B15BB19DCB}"/>
+              </a:ext>
+            </a:extLst>
+          </p:cNvPr>
+          <p:cNvSpPr>
+            <a:spLocks noGrp="1"/>
+          </p:cNvSpPr>
+          <p:nvPr>
+            <p:ph idx="1"/>
+          </p:nvPr>
+        </p:nvSpPr>
+        <p:spPr>
+          <a:xfrm>
+            <a:off x="838200" y="1742282"/>
+            <a:ext cx="10515600" cy="5137149"/>
+          </a:xfrm>
+        </p:spPr>
+        <p:txBody>
+          <a:bodyPr vert="horz" lIns="91440" tIns="45720" rIns="91440" bIns="45720" rtlCol="0" anchor="t">
+            <a:normAutofit/>
+          </a:bodyPr>
+          <a:lstStyle/>
+          <a:p>
+            <a:r>
+              <a:rPr lang="en-US" sz="2600" b="1" dirty="0">
+                <a:solidFill>
+                  <a:schemeClr val="tx2">
+                    <a:lumMod val="49000"/>
+                    <a:lumOff val="51000"/>
+                  </a:schemeClr>
+                </a:solidFill>
+              </a:rPr>
+              <a:t>dashboard-shell</a:t>
+            </a:r>
+            <a:endParaRPr lang="en-US" dirty="0">
+              <a:solidFill>
+                <a:schemeClr val="tx2">
+                  <a:lumMod val="49000"/>
+                  <a:lumOff val="51000"/>
+                </a:schemeClr>
+              </a:solidFill>
+            </a:endParaRPr>
+          </a:p>
+          <a:p>
+            <a:pPr lvl="1">
+              <a:buFont typeface="Courier New" panose="020B0604020202020204" pitchFamily="34" charset="0"/>
+              <a:buChar char="o"/>
+            </a:pPr>
+            <a:r>
+              <a:rPr lang="en-US" sz="2200" b="1" err="1">
+                <a:ea typeface="+mn-lt"/>
+                <a:cs typeface="+mn-lt"/>
+              </a:rPr>
+              <a:t>npm</a:t>
+            </a:r>
+            <a:r>
+              <a:rPr lang="en-US" sz="2200" b="1" dirty="0">
+                <a:ea typeface="+mn-lt"/>
+                <a:cs typeface="+mn-lt"/>
+              </a:rPr>
+              <a:t> run dev  </a:t>
+            </a:r>
+            <a:endParaRPr lang="en-US" sz="2200" b="1" dirty="0"/>
+          </a:p>
+          <a:p>
+            <a:pPr lvl="1">
+              <a:buFont typeface="Courier New" panose="020B0604020202020204" pitchFamily="34" charset="0"/>
+              <a:buChar char="o"/>
+            </a:pPr>
+            <a:r>
+              <a:rPr lang="en-US" sz="1600" b="1" dirty="0"/>
+              <a:t>Output: </a:t>
+            </a:r>
+            <a:r>
+              <a:rPr lang="en-US" sz="1600" dirty="0">
+                <a:ea typeface="+mn-lt"/>
+                <a:cs typeface="+mn-lt"/>
+              </a:rPr>
+              <a:t> </a:t>
+            </a:r>
+            <a:r>
+              <a:rPr lang="en-US" sz="1600" dirty="0">
+                <a:ea typeface="+mn-lt"/>
+                <a:cs typeface="+mn-lt"/>
+                <a:hlinkClick r:id="rId2"/>
+              </a:rPr>
+              <a:t>http://localhost:5000/</a:t>
+            </a:r>
+            <a:endParaRPr lang="en-US" sz="1600" b="1" dirty="0"/>
+          </a:p>
+          <a:p>
+            <a:pPr marL="457200" lvl="1" indent="0">
+              <a:buNone/>
+            </a:pPr>
+            <a:endParaRPr lang="en-US" sz="2200" dirty="0">
+              <a:solidFill>
+                <a:srgbClr val="000000"/>
+              </a:solidFill>
+            </a:endParaRPr>
+          </a:p>
+          <a:p>
+            <a:r>
+              <a:rPr lang="en-US" sz="2400" b="1" dirty="0">
+                <a:solidFill>
+                  <a:schemeClr val="tx2">
+                    <a:lumMod val="49000"/>
+                    <a:lumOff val="51000"/>
+                  </a:schemeClr>
+                </a:solidFill>
+              </a:rPr>
+              <a:t>user-list-micro-frontend</a:t>
+            </a:r>
+            <a:endParaRPr lang="en-US" sz="2600" b="1" dirty="0">
+              <a:solidFill>
+                <a:schemeClr val="tx2">
+                  <a:lumMod val="49000"/>
+                  <a:lumOff val="51000"/>
+                </a:schemeClr>
+              </a:solidFill>
+            </a:endParaRPr>
+          </a:p>
+          <a:p>
+            <a:pPr lvl="1">
+              <a:buFont typeface="Courier New" panose="020B0604020202020204" pitchFamily="34" charset="0"/>
+              <a:buChar char="o"/>
+            </a:pPr>
+            <a:r>
+              <a:rPr lang="en-US" sz="2000" b="1" dirty="0">
+                <a:ea typeface="+mn-lt"/>
+                <a:cs typeface="+mn-lt"/>
+              </a:rPr>
+              <a:t>http-server </a:t>
+            </a:r>
+            <a:r>
+              <a:rPr lang="en-US" sz="2000" b="1" dirty="0" err="1">
+                <a:ea typeface="+mn-lt"/>
+                <a:cs typeface="+mn-lt"/>
+              </a:rPr>
+              <a:t>dist</a:t>
+            </a:r>
+            <a:r>
+              <a:rPr lang="en-US" sz="2000" b="1" dirty="0">
+                <a:ea typeface="+mn-lt"/>
+                <a:cs typeface="+mn-lt"/>
+              </a:rPr>
+              <a:t> -p 5001 -c-1 –</a:t>
+            </a:r>
+            <a:r>
+              <a:rPr lang="en-US" sz="2000" b="1" dirty="0" err="1">
+                <a:ea typeface="+mn-lt"/>
+                <a:cs typeface="+mn-lt"/>
+              </a:rPr>
+              <a:t>cors</a:t>
+            </a:r>
+            <a:endParaRPr lang="en-US" sz="2000" b="1" dirty="0">
+              <a:ea typeface="+mn-lt"/>
+              <a:cs typeface="+mn-lt"/>
+            </a:endParaRPr>
+          </a:p>
+          <a:p>
+            <a:pPr lvl="1">
+              <a:buFont typeface="Courier New" panose="020B0604020202020204" pitchFamily="34" charset="0"/>
+              <a:buChar char="o"/>
+            </a:pPr>
+            <a:r>
+              <a:rPr lang="en-US" sz="1600" b="1" dirty="0"/>
+              <a:t>Output: </a:t>
+            </a:r>
+            <a:r>
+              <a:rPr lang="en-US" sz="1600" dirty="0">
+                <a:ea typeface="+mn-lt"/>
+                <a:cs typeface="+mn-lt"/>
+              </a:rPr>
+              <a:t>Available on:</a:t>
+            </a:r>
+            <a:endParaRPr lang="en-US" sz="1600"/>
+          </a:p>
+          <a:p>
+            <a:pPr lvl="2">
+              <a:buFont typeface="Wingdings" panose="020B0604020202020204" pitchFamily="34" charset="0"/>
+              <a:buChar char="§"/>
+            </a:pPr>
+            <a:r>
+              <a:rPr lang="en-US" sz="1600" dirty="0">
+                <a:ea typeface="+mn-lt"/>
+                <a:cs typeface="+mn-lt"/>
+              </a:rPr>
+              <a:t>  </a:t>
+            </a:r>
+            <a:r>
+              <a:rPr lang="en-US" sz="1600" dirty="0">
+                <a:ea typeface="+mn-lt"/>
+                <a:cs typeface="+mn-lt"/>
+                <a:hlinkClick r:id="rId3">
+                  <a:extLst>
+                    <a:ext uri="{A12FA001-AC4F-418D-AE19-62706E023703}">
+                      <ahyp:hlinkClr xmlns:ahyp="http://schemas.microsoft.com/office/drawing/2018/hyperlinkcolor" val="tx"/>
+                    </a:ext>
+                  </a:extLst>
+                </a:hlinkClick>
+              </a:rPr>
+              <a:t>http://192.168.1.1:5001</a:t>
+            </a:r>
+            <a:endParaRPr lang="en-US">
+              <a:hlinkClick r:id="rId3">
+                <a:extLst>
+                  <a:ext uri="{A12FA001-AC4F-418D-AE19-62706E023703}">
+                    <ahyp:hlinkClr xmlns:ahyp="http://schemas.microsoft.com/office/drawing/2018/hyperlinkcolor" val="tx"/>
+                  </a:ext>
+                </a:extLst>
+              </a:hlinkClick>
+            </a:endParaRPr>
+          </a:p>
+          <a:p>
+            <a:pPr lvl="2">
+              <a:buFont typeface="Wingdings" panose="020B0604020202020204" pitchFamily="34" charset="0"/>
+              <a:buChar char="§"/>
+            </a:pPr>
+            <a:r>
+              <a:rPr lang="en-US" sz="1600" dirty="0">
+                <a:ea typeface="+mn-lt"/>
+                <a:cs typeface="+mn-lt"/>
+              </a:rPr>
+              <a:t>  </a:t>
+            </a:r>
+            <a:r>
+              <a:rPr lang="en-US" sz="1600" dirty="0">
+                <a:ea typeface="+mn-lt"/>
+                <a:cs typeface="+mn-lt"/>
+                <a:hlinkClick r:id="rId4">
+                  <a:extLst>
+                    <a:ext uri="{A12FA001-AC4F-418D-AE19-62706E023703}">
+                      <ahyp:hlinkClr xmlns:ahyp="http://schemas.microsoft.com/office/drawing/2018/hyperlinkcolor" val="tx"/>
+                    </a:ext>
+                  </a:extLst>
+                </a:hlinkClick>
+              </a:rPr>
+              <a:t>http://127.0.0.1:5001</a:t>
+            </a:r>
+            <a:endParaRPr lang="en-US">
+              <a:hlinkClick r:id="rId4">
+                <a:extLst>
+                  <a:ext uri="{A12FA001-AC4F-418D-AE19-62706E023703}">
+                    <ahyp:hlinkClr xmlns:ahyp="http://schemas.microsoft.com/office/drawing/2018/hyperlinkcolor" val="tx"/>
+                  </a:ext>
+                </a:extLst>
+              </a:hlinkClick>
+            </a:endParaRPr>
+          </a:p>
+          <a:p>
+            <a:pPr lvl="2">
+              <a:buFont typeface="Wingdings" panose="020B0604020202020204" pitchFamily="34" charset="0"/>
+              <a:buChar char="§"/>
+            </a:pPr>
+            <a:endParaRPr lang="en-US" sz="1600" dirty="0">
+              <a:solidFill>
+                <a:schemeClr val="tx2">
+                  <a:lumMod val="49000"/>
+                  <a:lumOff val="51000"/>
+                </a:schemeClr>
+              </a:solidFill>
+            </a:endParaRPr>
+          </a:p>
+          <a:p>
+            <a:r>
+              <a:rPr lang="en-US" sz="2400" b="1" dirty="0">
+                <a:solidFill>
+                  <a:schemeClr val="tx2">
+                    <a:lumMod val="49000"/>
+                    <a:lumOff val="51000"/>
+                  </a:schemeClr>
+                </a:solidFill>
+              </a:rPr>
+              <a:t>user-details-micro-frontend</a:t>
+            </a:r>
+            <a:endParaRPr lang="en-US" dirty="0">
+              <a:solidFill>
+                <a:schemeClr val="tx2">
+                  <a:lumMod val="49000"/>
+                  <a:lumOff val="51000"/>
+                </a:schemeClr>
+              </a:solidFill>
+            </a:endParaRPr>
+          </a:p>
+          <a:p>
+            <a:pPr lvl="1">
+              <a:buFont typeface="Courier New" panose="020B0604020202020204" pitchFamily="34" charset="0"/>
+              <a:buChar char="o"/>
+            </a:pPr>
+            <a:r>
+              <a:rPr lang="en-US" sz="2000" b="1" dirty="0">
+                <a:ea typeface="+mn-lt"/>
+                <a:cs typeface="+mn-lt"/>
+              </a:rPr>
+              <a:t>http-server </a:t>
+            </a:r>
+            <a:r>
+              <a:rPr lang="en-US" sz="2000" b="1" dirty="0" err="1">
+                <a:ea typeface="+mn-lt"/>
+                <a:cs typeface="+mn-lt"/>
+              </a:rPr>
+              <a:t>dist</a:t>
+            </a:r>
+            <a:r>
+              <a:rPr lang="en-US" sz="2000" b="1" dirty="0">
+                <a:ea typeface="+mn-lt"/>
+                <a:cs typeface="+mn-lt"/>
+              </a:rPr>
+              <a:t> -p 5002 -c-1 –</a:t>
+            </a:r>
+            <a:r>
+              <a:rPr lang="en-US" sz="2000" b="1" dirty="0" err="1">
+                <a:ea typeface="+mn-lt"/>
+                <a:cs typeface="+mn-lt"/>
+              </a:rPr>
+              <a:t>cors</a:t>
+            </a:r>
+            <a:endParaRPr lang="en-US" sz="2000" b="1" dirty="0">
+              <a:ea typeface="+mn-lt"/>
+              <a:cs typeface="+mn-lt"/>
+            </a:endParaRPr>
+          </a:p>
+          <a:p>
+            <a:pPr marL="685800" lvl="1">
+              <a:spcBef>
+                <a:spcPts val="500"/>
+              </a:spcBef>
+              <a:buFont typeface="Courier New,monospace" panose="020B0604020202020204" pitchFamily="34" charset="0"/>
+              <a:buChar char="o"/>
+            </a:pPr>
+            <a:r>
+              <a:rPr lang="en-US" sz="1600" b="1" dirty="0">
+                <a:solidFill>
+                  <a:srgbClr val="000000"/>
+                </a:solidFill>
+              </a:rPr>
+              <a:t>Output: </a:t>
+            </a:r>
+            <a:r>
+              <a:rPr lang="en-US" sz="1600" dirty="0">
+                <a:solidFill>
+                  <a:srgbClr val="000000"/>
+                </a:solidFill>
+                <a:ea typeface="+mn-lt"/>
+                <a:cs typeface="+mn-lt"/>
+              </a:rPr>
+              <a:t>Available on:</a:t>
+            </a:r>
+          </a:p>
+          <a:p>
+            <a:pPr lvl="2">
+              <a:spcBef>
+                <a:spcPts val="500"/>
+              </a:spcBef>
+              <a:buFont typeface="Wingdings,Sans-Serif" panose="020B0604020202020204" pitchFamily="34" charset="0"/>
+              <a:buChar char="§"/>
+            </a:pPr>
+            <a:r>
+              <a:rPr lang="en-US" sz="1600" dirty="0">
+                <a:solidFill>
+                  <a:srgbClr val="000000"/>
+                </a:solidFill>
+                <a:ea typeface="+mn-lt"/>
+                <a:cs typeface="+mn-lt"/>
+              </a:rPr>
+              <a:t>  </a:t>
+            </a:r>
+            <a:r>
+              <a:rPr lang="en-US" sz="1600" dirty="0">
+                <a:solidFill>
+                  <a:srgbClr val="000000"/>
+                </a:solidFill>
+                <a:ea typeface="+mn-lt"/>
+                <a:cs typeface="+mn-lt"/>
+                <a:hlinkClick r:id="rId5">
+                  <a:extLst>
+                    <a:ext uri="{A12FA001-AC4F-418D-AE19-62706E023703}">
+                      <ahyp:hlinkClr xmlns:ahyp="http://schemas.microsoft.com/office/drawing/2018/hyperlinkcolor" val="tx"/>
+                    </a:ext>
+                  </a:extLst>
+                </a:hlinkClick>
+              </a:rPr>
+              <a:t>http://192.168.1.1:500</a:t>
+            </a:r>
+            <a:r>
+              <a:rPr lang="en-US" sz="1600" dirty="0">
+                <a:solidFill>
+                  <a:srgbClr val="000000"/>
+                </a:solidFill>
+                <a:ea typeface="+mn-lt"/>
+                <a:cs typeface="+mn-lt"/>
+              </a:rPr>
+              <a:t>2</a:t>
+            </a:r>
+          </a:p>
+          <a:p>
+            <a:pPr lvl="2">
+              <a:spcBef>
+                <a:spcPts val="500"/>
+              </a:spcBef>
+              <a:buFont typeface="Wingdings,Sans-Serif" panose="020B0604020202020204" pitchFamily="34" charset="0"/>
+              <a:buChar char="§"/>
+            </a:pPr>
+            <a:r>
+              <a:rPr lang="en-US" sz="1600" dirty="0">
+                <a:solidFill>
+                  <a:srgbClr val="000000"/>
+                </a:solidFill>
+                <a:ea typeface="+mn-lt"/>
+                <a:cs typeface="+mn-lt"/>
+              </a:rPr>
+              <a:t>  </a:t>
+            </a:r>
+            <a:r>
+              <a:rPr lang="en-US" sz="1600" dirty="0">
+                <a:solidFill>
+                  <a:srgbClr val="000000"/>
+                </a:solidFill>
+                <a:ea typeface="+mn-lt"/>
+                <a:cs typeface="+mn-lt"/>
+                <a:hlinkClick r:id="rId6">
+                  <a:extLst>
+                    <a:ext uri="{A12FA001-AC4F-418D-AE19-62706E023703}">
+                      <ahyp:hlinkClr xmlns:ahyp="http://schemas.microsoft.com/office/drawing/2018/hyperlinkcolor" val="tx"/>
+                    </a:ext>
+                  </a:extLst>
+                </a:hlinkClick>
+              </a:rPr>
+              <a:t>http://127.0.0.1:5002</a:t>
+            </a:r>
+            <a:endParaRPr lang="en-US" dirty="0"/>
+          </a:p>
+          <a:p>
+            <a:endParaRPr lang="en-US" dirty="0"/>
+          </a:p>
+        </p:txBody>
+      </p:sp>
+    </p:spTree>
+    <p:extLst>
+      <p:ext uri="{BB962C8B-B14F-4D97-AF65-F5344CB8AC3E}">
+        <p14:creationId xmlns:p14="http://schemas.microsoft.com/office/powerpoint/2010/main" val="506051401"/>
+      </p:ext>
+    </p:extLst>
+  </p:cSld>
+  <p:clrMapOvr>
+    <a:masterClrMapping/>
+  </p:clrMapOvr>
+</p:sld>
+</file>
+
+<file path=ppt/slides/slide8.xml><?xml version="1.0" encoding="utf-8"?>
+<p:sld xmlns:a="http://schemas.openxmlformats.org/drawingml/2006/main" xmlns:r="http://schemas.openxmlformats.org/officeDocument/2006/relationships" xmlns:p="http://schemas.openxmlformats.org/presentationml/2006/main">
+  <p:cSld>
+    <p:spTree>
+      <p:nvGrpSpPr>
+        <p:cNvPr id="1" name=""/>
+        <p:cNvGrpSpPr/>
+        <p:nvPr/>
+      </p:nvGrpSpPr>
+      <p:grpSpPr>
+        <a:xfrm>
+          <a:off x="0" y="0"/>
+          <a:ext cx="0" cy="0"/>
+          <a:chOff x="0" y="0"/>
+          <a:chExt cx="0" cy="0"/>
+        </a:xfrm>
+      </p:grpSpPr>
+      <p:pic>
+        <p:nvPicPr>
+          <p:cNvPr id="4" name="Content Placeholder 3" descr="A screenshot of a computer&#10;&#10;AI-generated content may be incorrect.">
+            <a:extLst>
+              <a:ext uri="{FF2B5EF4-FFF2-40B4-BE49-F238E27FC236}">
+                <a16:creationId xmlns:a16="http://schemas.microsoft.com/office/drawing/2014/main" id="{1392D4AA-12FF-F67E-501B-110C6E8443DB}"/>
+              </a:ext>
+            </a:extLst>
+          </p:cNvPr>
+          <p:cNvPicPr>
+            <a:picLocks noGrp="1" noChangeAspect="1"/>
+          </p:cNvPicPr>
+          <p:nvPr>
+            <p:ph idx="1"/>
+          </p:nvPr>
+        </p:nvPicPr>
+        <p:blipFill>
+          <a:blip r:embed="rId2"/>
+          <a:stretch>
+            <a:fillRect/>
+          </a:stretch>
+        </p:blipFill>
+        <p:spPr>
+          <a:xfrm>
+            <a:off x="1065916" y="1246908"/>
+            <a:ext cx="10060167" cy="4351338"/>
+          </a:xfrm>
+          <a:prstGeom prst="rect">
+            <a:avLst/>
+          </a:prstGeom>
+        </p:spPr>
+      </p:pic>
+      <p:sp>
+        <p:nvSpPr>
+          <p:cNvPr id="5" name="TextBox 4">
+            <a:extLst>
+              <a:ext uri="{FF2B5EF4-FFF2-40B4-BE49-F238E27FC236}">
+                <a16:creationId xmlns:a16="http://schemas.microsoft.com/office/drawing/2014/main" id="{B7012BB4-A868-898C-C583-3C18A4C485A7}"/>
+              </a:ext>
+            </a:extLst>
+          </p:cNvPr>
+          <p:cNvSpPr txBox="1"/>
+          <p:nvPr/>
+        </p:nvSpPr>
+        <p:spPr>
+          <a:xfrm>
+            <a:off x="1512098" y="571237"/>
+            <a:ext cx="2743200" cy="365760"/>
+          </a:xfrm>
+          <a:prstGeom prst="rect">
+            <a:avLst/>
+          </a:prstGeom>
+          <a:noFill/>
+        </p:spPr>
+        <p:txBody>
+          <a:bodyPr rot="0" spcFirstLastPara="0" vertOverflow="overflow" horzOverflow="overflow" vert="horz" wrap="square" lIns="91440" tIns="45720" rIns="91440" bIns="45720" numCol="1" spcCol="0" rtlCol="0" fromWordArt="0" anchor="t" anchorCtr="0" forceAA="0" compatLnSpc="1">
+            <a:prstTxWarp prst="textNoShape">
+              <a:avLst/>
+            </a:prstTxWarp>
+            <a:spAutoFit/>
+          </a:bodyPr>
+          <a:lstStyle/>
+          <a:p>
+            <a:r>
+              <a:rPr lang="en-US" dirty="0"/>
+              <a:t>Home Page</a:t>
+            </a:r>
+          </a:p>
+        </p:txBody>
+      </p:sp>
+    </p:spTree>
+    <p:extLst>
+      <p:ext uri="{BB962C8B-B14F-4D97-AF65-F5344CB8AC3E}">
+        <p14:creationId xmlns:p14="http://schemas.microsoft.com/office/powerpoint/2010/main" val="2190669261"/>
+      </p:ext>
+    </p:extLst>
+  </p:cSld>
+  <p:clrMapOvr>
+    <a:masterClrMapping/>
+  </p:clrMapOvr>
+</p:sld>
+</file>
+
+<file path=ppt/slides/slide9.xml><?xml version="1.0" encoding="utf-8"?>
+<p:sld xmlns:a="http://schemas.openxmlformats.org/drawingml/2006/main" xmlns:r="http://schemas.openxmlformats.org/officeDocument/2006/relationships" xmlns:p="http://schemas.openxmlformats.org/presentationml/2006/main">
+  <p:cSld>
+    <p:spTree>
+      <p:nvGrpSpPr>
+        <p:cNvPr id="1" name=""/>
+        <p:cNvGrpSpPr/>
+        <p:nvPr/>
+      </p:nvGrpSpPr>
+      <p:grpSpPr>
+        <a:xfrm>
+          <a:off x="0" y="0"/>
+          <a:ext cx="0" cy="0"/>
+          <a:chOff x="0" y="0"/>
+          <a:chExt cx="0" cy="0"/>
+        </a:xfrm>
+      </p:grpSpPr>
+      <p:pic>
+        <p:nvPicPr>
+          <p:cNvPr id="4" name="Picture 3" descr="A screenshot of a user list&#10;&#10;AI-generated content may be incorrect.">
+            <a:extLst>
+              <a:ext uri="{FF2B5EF4-FFF2-40B4-BE49-F238E27FC236}">
+                <a16:creationId xmlns:a16="http://schemas.microsoft.com/office/drawing/2014/main" id="{D9B877B8-B6C9-FFEF-1E50-4B95B7E06C4E}"/>
+              </a:ext>
+            </a:extLst>
+          </p:cNvPr>
+          <p:cNvPicPr>
+            <a:picLocks noChangeAspect="1"/>
+          </p:cNvPicPr>
+          <p:nvPr/>
+        </p:nvPicPr>
+        <p:blipFill>
+          <a:blip r:embed="rId2"/>
+          <a:stretch>
+            <a:fillRect/>
+          </a:stretch>
+        </p:blipFill>
+        <p:spPr>
+          <a:xfrm>
+            <a:off x="358588" y="913466"/>
+            <a:ext cx="12192000" cy="5949950"/>
+          </a:xfrm>
+          <a:prstGeom prst="rect">
+            <a:avLst/>
+          </a:prstGeom>
+        </p:spPr>
+      </p:pic>
+      <p:sp>
+        <p:nvSpPr>
+          <p:cNvPr id="5" name="TextBox 4">
+            <a:extLst>
+              <a:ext uri="{FF2B5EF4-FFF2-40B4-BE49-F238E27FC236}">
+                <a16:creationId xmlns:a16="http://schemas.microsoft.com/office/drawing/2014/main" id="{922B41D3-6573-553E-22B3-86C50F034414}"/>
+              </a:ext>
+            </a:extLst>
+          </p:cNvPr>
+          <p:cNvSpPr txBox="1"/>
+          <p:nvPr/>
+        </p:nvSpPr>
+        <p:spPr>
+          <a:xfrm>
+            <a:off x="840054" y="453629"/>
+            <a:ext cx="5286935" cy="369332"/>
+          </a:xfrm>
+          <a:prstGeom prst="rect">
+            <a:avLst/>
+          </a:prstGeom>
+          <a:noFill/>
+        </p:spPr>
+        <p:txBody>
+          <a:bodyPr rot="0" spcFirstLastPara="0" vertOverflow="overflow" horzOverflow="overflow" vert="horz" wrap="square" lIns="91440" tIns="45720" rIns="91440" bIns="45720" numCol="1" spcCol="0" rtlCol="0" fromWordArt="0" anchor="t" anchorCtr="0" forceAA="0" compatLnSpc="1">
+            <a:prstTxWarp prst="textNoShape">
+              <a:avLst/>
+            </a:prstTxWarp>
+            <a:spAutoFit/>
+          </a:bodyPr>
+          <a:lstStyle/>
+          <a:p>
+            <a:r>
+              <a:rPr lang="en-US" dirty="0"/>
+              <a:t>User Lists (On click of User List)</a:t>
+            </a:r>
+          </a:p>
+        </p:txBody>
+      </p:sp>
+    </p:spTree>
+    <p:extLst>
+      <p:ext uri="{BB962C8B-B14F-4D97-AF65-F5344CB8AC3E}">
+        <p14:creationId xmlns:p14="http://schemas.microsoft.com/office/powerpoint/2010/main" val="3833522368"/>
       </p:ext>
     </p:extLst>
   </p:cSld>

</xml_diff>

<commit_message>
Deployment to Vercel is working fine.  Updated the screenshots and steps
</commit_message>
<xml_diff>
--- a/User-Dashboard-MFE.pptx
+++ b/User-Dashboard-MFE.pptx
@@ -16,6 +16,8 @@
     <p:sldId id="264" r:id="rId10"/>
     <p:sldId id="265" r:id="rId11"/>
     <p:sldId id="266" r:id="rId12"/>
+    <p:sldId id="267" r:id="rId13"/>
+    <p:sldId id="268" r:id="rId14"/>
   </p:sldIdLst>
   <p:sldSz cx="12192000" cy="6858000"/>
   <p:notesSz cx="6858000" cy="9144000"/>
@@ -125,7 +127,7 @@
 <file path=ppt/revisionInfo.xml><?xml version="1.0" encoding="utf-8"?>
 <p1510:revInfo xmlns:a="http://schemas.openxmlformats.org/drawingml/2006/main" xmlns:r="http://schemas.openxmlformats.org/officeDocument/2006/relationships" xmlns:p1510="http://schemas.microsoft.com/office/powerpoint/2015/10/main">
   <p1510:revLst>
-    <p1510:client id="{1625D5F3-DDCE-1FDF-5ABF-2B603269BE8E}" v="279" dt="2025-11-10T05:32:19.184"/>
+    <p1510:client id="{1625D5F3-DDCE-1FDF-5ABF-2B603269BE8E}" v="347" dt="2025-11-10T06:01:18.194"/>
     <p1510:client id="{FBBF9802-8D48-4786-8A1E-466268931D3E}" v="339" dt="2025-11-09T11:59:58.043"/>
   </p1510:revLst>
 </p1510:revInfo>
@@ -3936,6 +3938,315 @@
 </p:sld>
 </file>
 
+<file path=ppt/slides/slide12.xml><?xml version="1.0" encoding="utf-8"?>
+<p:sld xmlns:a="http://schemas.openxmlformats.org/drawingml/2006/main" xmlns:r="http://schemas.openxmlformats.org/officeDocument/2006/relationships" xmlns:p="http://schemas.openxmlformats.org/presentationml/2006/main">
+  <p:cSld>
+    <p:spTree>
+      <p:nvGrpSpPr>
+        <p:cNvPr id="1" name=""/>
+        <p:cNvGrpSpPr/>
+        <p:nvPr/>
+      </p:nvGrpSpPr>
+      <p:grpSpPr>
+        <a:xfrm>
+          <a:off x="0" y="0"/>
+          <a:ext cx="0" cy="0"/>
+          <a:chOff x="0" y="0"/>
+          <a:chExt cx="0" cy="0"/>
+        </a:xfrm>
+      </p:grpSpPr>
+      <p:sp>
+        <p:nvSpPr>
+          <p:cNvPr id="2" name="Title 1">
+            <a:extLst>
+              <a:ext uri="{FF2B5EF4-FFF2-40B4-BE49-F238E27FC236}">
+                <a16:creationId xmlns:a16="http://schemas.microsoft.com/office/drawing/2014/main" id="{46BE0EA9-1FA2-EF23-CE73-003BF2FF04D6}"/>
+              </a:ext>
+            </a:extLst>
+          </p:cNvPr>
+          <p:cNvSpPr>
+            <a:spLocks noGrp="1"/>
+          </p:cNvSpPr>
+          <p:nvPr>
+            <p:ph type="title"/>
+          </p:nvPr>
+        </p:nvSpPr>
+        <p:spPr>
+          <a:xfrm>
+            <a:off x="636494" y="499596"/>
+            <a:ext cx="10515600" cy="1325563"/>
+          </a:xfrm>
+        </p:spPr>
+        <p:txBody>
+          <a:bodyPr>
+            <a:normAutofit fontScale="90000"/>
+          </a:bodyPr>
+          <a:lstStyle/>
+          <a:p>
+            <a:r>
+              <a:rPr lang="en-US" dirty="0"/>
+              <a:t>Deployed in </a:t>
+            </a:r>
+            <a:r>
+              <a:rPr lang="en-US" dirty="0" err="1"/>
+              <a:t>vercel</a:t>
+            </a:r>
+            <a:br>
+              <a:rPr lang="en-US" dirty="0"/>
+            </a:br>
+            <a:br>
+              <a:rPr lang="en-US" dirty="0"/>
+            </a:br>
+            <a:r>
+              <a:rPr lang="en-US" sz="3200" i="1" dirty="0">
+                <a:solidFill>
+                  <a:schemeClr val="accent4"/>
+                </a:solidFill>
+                <a:ea typeface="+mj-lt"/>
+                <a:cs typeface="+mj-lt"/>
+              </a:rPr>
+              <a:t>https://mfe-user-management-system-erwz8peji-maumita-sarkars-projects.vercel.app/</a:t>
+            </a:r>
+            <a:endParaRPr lang="en-US" sz="3200" i="1">
+              <a:solidFill>
+                <a:schemeClr val="accent4"/>
+              </a:solidFill>
+            </a:endParaRPr>
+          </a:p>
+        </p:txBody>
+      </p:sp>
+      <p:sp>
+        <p:nvSpPr>
+          <p:cNvPr id="3" name="Content Placeholder 2">
+            <a:extLst>
+              <a:ext uri="{FF2B5EF4-FFF2-40B4-BE49-F238E27FC236}">
+                <a16:creationId xmlns:a16="http://schemas.microsoft.com/office/drawing/2014/main" id="{B441839F-4CE2-58F5-FE63-99D36561A267}"/>
+              </a:ext>
+            </a:extLst>
+          </p:cNvPr>
+          <p:cNvSpPr>
+            <a:spLocks noGrp="1"/>
+          </p:cNvSpPr>
+          <p:nvPr>
+            <p:ph idx="1"/>
+          </p:nvPr>
+        </p:nvSpPr>
+        <p:spPr>
+          <a:xfrm>
+            <a:off x="636494" y="2778125"/>
+            <a:ext cx="10515600" cy="4351338"/>
+          </a:xfrm>
+        </p:spPr>
+        <p:txBody>
+          <a:bodyPr vert="horz" lIns="91440" tIns="45720" rIns="91440" bIns="45720" rtlCol="0" anchor="t">
+            <a:normAutofit/>
+          </a:bodyPr>
+          <a:lstStyle/>
+          <a:p>
+            <a:r>
+              <a:rPr lang="en-US" dirty="0"/>
+              <a:t>First import the git project to </a:t>
+            </a:r>
+            <a:r>
+              <a:rPr lang="en-US" dirty="0" err="1"/>
+              <a:t>Vercel</a:t>
+            </a:r>
+            <a:r>
+              <a:rPr lang="en-US" dirty="0"/>
+              <a:t>.</a:t>
+            </a:r>
+          </a:p>
+          <a:p>
+            <a:r>
+              <a:rPr lang="en-US" dirty="0"/>
+              <a:t>Vercel Dashboard </a:t>
+            </a:r>
+            <a:r>
+              <a:rPr lang="en-US" b="1" dirty="0"/>
+              <a:t>&gt;</a:t>
+            </a:r>
+            <a:r>
+              <a:rPr lang="en-US" dirty="0"/>
+              <a:t> </a:t>
+            </a:r>
+            <a:r>
+              <a:rPr lang="en-US" dirty="0">
+                <a:ea typeface="+mn-lt"/>
+                <a:cs typeface="+mn-lt"/>
+              </a:rPr>
+              <a:t>Go to </a:t>
+            </a:r>
+            <a:r>
+              <a:rPr lang="en-US" b="1" dirty="0">
+                <a:ea typeface="+mn-lt"/>
+                <a:cs typeface="+mn-lt"/>
+              </a:rPr>
+              <a:t>Project Settings → Build &amp; Development Settings &gt;</a:t>
+            </a:r>
+            <a:endParaRPr lang="en-US"/>
+          </a:p>
+          <a:p>
+            <a:pPr lvl="1">
+              <a:buFont typeface="Courier New" panose="020B0604020202020204" pitchFamily="34" charset="0"/>
+              <a:buChar char="o"/>
+            </a:pPr>
+            <a:r>
+              <a:rPr lang="en-US" dirty="0">
+                <a:ea typeface="+mn-lt"/>
+                <a:cs typeface="+mn-lt"/>
+              </a:rPr>
+              <a:t>Build Command: </a:t>
+            </a:r>
+            <a:r>
+              <a:rPr lang="en-US" err="1">
+                <a:ea typeface="+mn-lt"/>
+                <a:cs typeface="+mn-lt"/>
+              </a:rPr>
+              <a:t>npm</a:t>
+            </a:r>
+            <a:r>
+              <a:rPr lang="en-US">
+                <a:ea typeface="+mn-lt"/>
+                <a:cs typeface="+mn-lt"/>
+              </a:rPr>
+              <a:t> run build</a:t>
+            </a:r>
+          </a:p>
+          <a:p>
+            <a:pPr lvl="1">
+              <a:buFont typeface="Courier New" panose="020B0604020202020204" pitchFamily="34" charset="0"/>
+              <a:buChar char="o"/>
+            </a:pPr>
+            <a:r>
+              <a:rPr lang="en-US" dirty="0">
+                <a:ea typeface="+mn-lt"/>
+                <a:cs typeface="+mn-lt"/>
+              </a:rPr>
+              <a:t>Output Directory: </a:t>
+            </a:r>
+            <a:r>
+              <a:rPr lang="en-US" dirty="0" err="1">
+                <a:ea typeface="+mn-lt"/>
+                <a:cs typeface="+mn-lt"/>
+              </a:rPr>
+              <a:t>dist</a:t>
+            </a:r>
+          </a:p>
+          <a:p>
+            <a:pPr lvl="1">
+              <a:buFont typeface="Courier New" panose="020B0604020202020204" pitchFamily="34" charset="0"/>
+              <a:buChar char="o"/>
+            </a:pPr>
+            <a:r>
+              <a:rPr lang="en-US" b="1" dirty="0">
+                <a:ea typeface="+mn-lt"/>
+                <a:cs typeface="+mn-lt"/>
+              </a:rPr>
+              <a:t>Root Directory</a:t>
+            </a:r>
+            <a:r>
+              <a:rPr lang="en-US" dirty="0">
+                <a:ea typeface="+mn-lt"/>
+                <a:cs typeface="+mn-lt"/>
+              </a:rPr>
+              <a:t> = </a:t>
+            </a:r>
+            <a:r>
+              <a:rPr lang="en-US" dirty="0">
+                <a:latin typeface="Aptos"/>
+                <a:ea typeface="+mn-lt"/>
+                <a:cs typeface="+mn-lt"/>
+              </a:rPr>
+              <a:t> </a:t>
+            </a:r>
+            <a:r>
+              <a:rPr lang="en-US" dirty="0">
+                <a:latin typeface="Consolas"/>
+                <a:ea typeface="+mn-lt"/>
+                <a:cs typeface="+mn-lt"/>
+              </a:rPr>
+              <a:t>dashboard-shell</a:t>
+            </a:r>
+            <a:endParaRPr lang="en-US" dirty="0">
+              <a:ea typeface="+mn-lt"/>
+              <a:cs typeface="+mn-lt"/>
+            </a:endParaRPr>
+          </a:p>
+        </p:txBody>
+      </p:sp>
+    </p:spTree>
+    <p:extLst>
+      <p:ext uri="{BB962C8B-B14F-4D97-AF65-F5344CB8AC3E}">
+        <p14:creationId xmlns:p14="http://schemas.microsoft.com/office/powerpoint/2010/main" val="25881985"/>
+      </p:ext>
+    </p:extLst>
+  </p:cSld>
+  <p:clrMapOvr>
+    <a:masterClrMapping/>
+  </p:clrMapOvr>
+</p:sld>
+</file>
+
+<file path=ppt/slides/slide13.xml><?xml version="1.0" encoding="utf-8"?>
+<p:sld xmlns:a="http://schemas.openxmlformats.org/drawingml/2006/main" xmlns:r="http://schemas.openxmlformats.org/officeDocument/2006/relationships" xmlns:p="http://schemas.openxmlformats.org/presentationml/2006/main">
+  <p:cSld>
+    <p:spTree>
+      <p:nvGrpSpPr>
+        <p:cNvPr id="1" name=""/>
+        <p:cNvGrpSpPr/>
+        <p:nvPr/>
+      </p:nvGrpSpPr>
+      <p:grpSpPr>
+        <a:xfrm>
+          <a:off x="0" y="0"/>
+          <a:ext cx="0" cy="0"/>
+          <a:chOff x="0" y="0"/>
+          <a:chExt cx="0" cy="0"/>
+        </a:xfrm>
+      </p:grpSpPr>
+      <p:pic>
+        <p:nvPicPr>
+          <p:cNvPr id="4" name="Picture 3" descr="A screenshot of a computer&#10;&#10;AI-generated content may be incorrect.">
+            <a:extLst>
+              <a:ext uri="{FF2B5EF4-FFF2-40B4-BE49-F238E27FC236}">
+                <a16:creationId xmlns:a16="http://schemas.microsoft.com/office/drawing/2014/main" id="{0EFCB3B6-1DFC-7BE7-B22D-462B9514826A}"/>
+              </a:ext>
+            </a:extLst>
+          </p:cNvPr>
+          <p:cNvPicPr>
+            <a:picLocks noChangeAspect="1"/>
+          </p:cNvPicPr>
+          <p:nvPr/>
+        </p:nvPicPr>
+        <p:blipFill>
+          <a:blip r:embed="rId2"/>
+          <a:stretch>
+            <a:fillRect/>
+          </a:stretch>
+        </p:blipFill>
+        <p:spPr>
+          <a:xfrm>
+            <a:off x="0" y="384175"/>
+            <a:ext cx="12192000" cy="6089650"/>
+          </a:xfrm>
+          <a:prstGeom prst="rect">
+            <a:avLst/>
+          </a:prstGeom>
+        </p:spPr>
+      </p:pic>
+    </p:spTree>
+    <p:extLst>
+      <p:ext uri="{BB962C8B-B14F-4D97-AF65-F5344CB8AC3E}">
+        <p14:creationId xmlns:p14="http://schemas.microsoft.com/office/powerpoint/2010/main" val="4223246008"/>
+      </p:ext>
+    </p:extLst>
+  </p:cSld>
+  <p:clrMapOvr>
+    <a:masterClrMapping/>
+  </p:clrMapOvr>
+</p:sld>
+</file>
+
 <file path=ppt/slides/slide2.xml><?xml version="1.0" encoding="utf-8"?>
 <p:sld xmlns:a="http://schemas.openxmlformats.org/drawingml/2006/main" xmlns:r="http://schemas.openxmlformats.org/officeDocument/2006/relationships" xmlns:p="http://schemas.openxmlformats.org/presentationml/2006/main">
   <p:cSld>
@@ -4104,7 +4415,7 @@
           </a:p>
           <a:p>
             <a:r>
-              <a:rPr lang="en-US" b="1" dirty="0" err="1">
+              <a:rPr lang="en-US" b="1" err="1">
                 <a:ea typeface="+mn-lt"/>
                 <a:cs typeface="+mn-lt"/>
               </a:rPr>
@@ -4124,10 +4435,596 @@
               </a:rPr>
               <a:t>:  Displays selected user details. Shows detailed information of a selected user.</a:t>
             </a:r>
+          </a:p>
+          <a:p>
             <a:endParaRPr lang="en-US" dirty="0"/>
           </a:p>
-        </p:txBody>
-      </p:sp>
+          <a:p>
+            <a:endParaRPr lang="en-US" dirty="0"/>
+          </a:p>
+        </p:txBody>
+      </p:sp>
+      <p:graphicFrame>
+        <p:nvGraphicFramePr>
+          <p:cNvPr id="5" name="Table 4">
+            <a:extLst>
+              <a:ext uri="{FF2B5EF4-FFF2-40B4-BE49-F238E27FC236}">
+                <a16:creationId xmlns:a16="http://schemas.microsoft.com/office/drawing/2014/main" id="{1A1E5F45-30E2-5DA7-7476-F81F1949F297}"/>
+              </a:ext>
+            </a:extLst>
+          </p:cNvPr>
+          <p:cNvGraphicFramePr>
+            <a:graphicFrameLocks noGrp="1"/>
+          </p:cNvGraphicFramePr>
+          <p:nvPr>
+            <p:extLst>
+              <p:ext uri="{D42A27DB-BD31-4B8C-83A1-F6EECF244321}">
+                <p14:modId xmlns:p14="http://schemas.microsoft.com/office/powerpoint/2010/main" val="112314565"/>
+              </p:ext>
+            </p:extLst>
+          </p:nvPr>
+        </p:nvGraphicFramePr>
+        <p:xfrm>
+          <a:off x="168088" y="4790290"/>
+          <a:ext cx="12192000" cy="1737360"/>
+        </p:xfrm>
+        <a:graphic>
+          <a:graphicData uri="http://schemas.openxmlformats.org/drawingml/2006/table">
+            <a:tbl>
+              <a:tblPr bandRow="1">
+                <a:tableStyleId>{5C22544A-7EE6-4342-B048-85BDC9FD1C3A}</a:tableStyleId>
+              </a:tblPr>
+              <a:tblGrid>
+                <a:gridCol w="3048000">
+                  <a:extLst>
+                    <a:ext uri="{9D8B030D-6E8A-4147-A177-3AD203B41FA5}">
+                      <a16:colId xmlns:a16="http://schemas.microsoft.com/office/drawing/2014/main" val="2499079910"/>
+                    </a:ext>
+                  </a:extLst>
+                </a:gridCol>
+                <a:gridCol w="3048000">
+                  <a:extLst>
+                    <a:ext uri="{9D8B030D-6E8A-4147-A177-3AD203B41FA5}">
+                      <a16:colId xmlns:a16="http://schemas.microsoft.com/office/drawing/2014/main" val="3700380628"/>
+                    </a:ext>
+                  </a:extLst>
+                </a:gridCol>
+                <a:gridCol w="3048000">
+                  <a:extLst>
+                    <a:ext uri="{9D8B030D-6E8A-4147-A177-3AD203B41FA5}">
+                      <a16:colId xmlns:a16="http://schemas.microsoft.com/office/drawing/2014/main" val="2436233486"/>
+                    </a:ext>
+                  </a:extLst>
+                </a:gridCol>
+                <a:gridCol w="3048000">
+                  <a:extLst>
+                    <a:ext uri="{9D8B030D-6E8A-4147-A177-3AD203B41FA5}">
+                      <a16:colId xmlns:a16="http://schemas.microsoft.com/office/drawing/2014/main" val="2769450028"/>
+                    </a:ext>
+                  </a:extLst>
+                </a:gridCol>
+              </a:tblGrid>
+              <a:tr h="0">
+                <a:tc>
+                  <a:txBody>
+                    <a:bodyPr/>
+                    <a:lstStyle/>
+                    <a:p>
+                      <a:pPr>
+                        <a:buNone/>
+                      </a:pPr>
+                      <a:r>
+                        <a:rPr lang="en-US"/>
+                        <a:t>App</a:t>
+                      </a:r>
+                    </a:p>
+                  </a:txBody>
+                  <a:tcPr anchor="ctr">
+                    <a:lnL>
+                      <a:noFill/>
+                    </a:lnL>
+                    <a:lnR>
+                      <a:noFill/>
+                    </a:lnR>
+                    <a:lnT>
+                      <a:noFill/>
+                    </a:lnT>
+                    <a:lnB>
+                      <a:noFill/>
+                    </a:lnB>
+                    <a:noFill/>
+                  </a:tcPr>
+                </a:tc>
+                <a:tc>
+                  <a:txBody>
+                    <a:bodyPr/>
+                    <a:lstStyle/>
+                    <a:p>
+                      <a:pPr>
+                        <a:buNone/>
+                      </a:pPr>
+                      <a:r>
+                        <a:rPr lang="en-US"/>
+                        <a:t>Folder</a:t>
+                      </a:r>
+                    </a:p>
+                  </a:txBody>
+                  <a:tcPr anchor="ctr">
+                    <a:lnL>
+                      <a:noFill/>
+                    </a:lnL>
+                    <a:lnR>
+                      <a:noFill/>
+                    </a:lnR>
+                    <a:lnT>
+                      <a:noFill/>
+                    </a:lnT>
+                    <a:lnB>
+                      <a:noFill/>
+                    </a:lnB>
+                    <a:noFill/>
+                  </a:tcPr>
+                </a:tc>
+                <a:tc>
+                  <a:txBody>
+                    <a:bodyPr/>
+                    <a:lstStyle/>
+                    <a:p>
+                      <a:pPr>
+                        <a:buNone/>
+                      </a:pPr>
+                      <a:r>
+                        <a:rPr lang="en-US"/>
+                        <a:t>Port (Local)</a:t>
+                      </a:r>
+                    </a:p>
+                  </a:txBody>
+                  <a:tcPr anchor="ctr">
+                    <a:lnL>
+                      <a:noFill/>
+                    </a:lnL>
+                    <a:lnR>
+                      <a:noFill/>
+                    </a:lnR>
+                    <a:lnT>
+                      <a:noFill/>
+                    </a:lnT>
+                    <a:lnB>
+                      <a:noFill/>
+                    </a:lnB>
+                    <a:noFill/>
+                  </a:tcPr>
+                </a:tc>
+                <a:tc>
+                  <a:txBody>
+                    <a:bodyPr/>
+                    <a:lstStyle/>
+                    <a:p>
+                      <a:pPr>
+                        <a:buNone/>
+                      </a:pPr>
+                      <a:r>
+                        <a:rPr lang="en-US"/>
+                        <a:t>Role</a:t>
+                      </a:r>
+                    </a:p>
+                  </a:txBody>
+                  <a:tcPr anchor="ctr">
+                    <a:lnL>
+                      <a:noFill/>
+                    </a:lnL>
+                    <a:lnR>
+                      <a:noFill/>
+                    </a:lnR>
+                    <a:lnT>
+                      <a:noFill/>
+                    </a:lnT>
+                    <a:lnB>
+                      <a:noFill/>
+                    </a:lnB>
+                    <a:noFill/>
+                  </a:tcPr>
+                </a:tc>
+                <a:extLst>
+                  <a:ext uri="{0D108BD9-81ED-4DB2-BD59-A6C34878D82A}">
+                    <a16:rowId xmlns:a16="http://schemas.microsoft.com/office/drawing/2014/main" val="3673092732"/>
+                  </a:ext>
+                </a:extLst>
+              </a:tr>
+              <a:tr h="0">
+                <a:tc>
+                  <a:txBody>
+                    <a:bodyPr/>
+                    <a:lstStyle/>
+                    <a:p>
+                      <a:pPr>
+                        <a:buNone/>
+                      </a:pPr>
+                      <a:r>
+                        <a:rPr lang="en-US"/>
+                        <a:t>Shell</a:t>
+                      </a:r>
+                    </a:p>
+                  </a:txBody>
+                  <a:tcPr anchor="ctr">
+                    <a:lnL>
+                      <a:noFill/>
+                    </a:lnL>
+                    <a:lnR>
+                      <a:noFill/>
+                    </a:lnR>
+                    <a:lnT>
+                      <a:noFill/>
+                    </a:lnT>
+                    <a:lnB>
+                      <a:noFill/>
+                    </a:lnB>
+                    <a:noFill/>
+                  </a:tcPr>
+                </a:tc>
+                <a:tc>
+                  <a:txBody>
+                    <a:bodyPr/>
+                    <a:lstStyle/>
+                    <a:p>
+                      <a:pPr>
+                        <a:buNone/>
+                      </a:pPr>
+                      <a:r>
+                        <a:rPr lang="en-US">
+                          <a:latin typeface="Courier New" panose="02070309020205020404" pitchFamily="49" charset="0"/>
+                        </a:rPr>
+                        <a:t>/shell</a:t>
+                      </a:r>
+                      <a:endParaRPr lang="en-US"/>
+                    </a:p>
+                  </a:txBody>
+                  <a:tcPr anchor="ctr">
+                    <a:lnL>
+                      <a:noFill/>
+                    </a:lnL>
+                    <a:lnR>
+                      <a:noFill/>
+                    </a:lnR>
+                    <a:lnT>
+                      <a:noFill/>
+                    </a:lnT>
+                    <a:lnB>
+                      <a:noFill/>
+                    </a:lnB>
+                    <a:noFill/>
+                  </a:tcPr>
+                </a:tc>
+                <a:tc>
+                  <a:txBody>
+                    <a:bodyPr/>
+                    <a:lstStyle/>
+                    <a:p>
+                      <a:pPr>
+                        <a:buNone/>
+                      </a:pPr>
+                      <a:r>
+                        <a:rPr lang="en-US"/>
+                        <a:t>5000</a:t>
+                      </a:r>
+                    </a:p>
+                  </a:txBody>
+                  <a:tcPr anchor="ctr">
+                    <a:lnL>
+                      <a:noFill/>
+                    </a:lnL>
+                    <a:lnR>
+                      <a:noFill/>
+                    </a:lnR>
+                    <a:lnT>
+                      <a:noFill/>
+                    </a:lnT>
+                    <a:lnB>
+                      <a:noFill/>
+                    </a:lnB>
+                    <a:noFill/>
+                  </a:tcPr>
+                </a:tc>
+                <a:tc>
+                  <a:txBody>
+                    <a:bodyPr/>
+                    <a:lstStyle/>
+                    <a:p>
+                      <a:pPr>
+                        <a:buNone/>
+                      </a:pPr>
+                      <a:r>
+                        <a:rPr lang="en-US"/>
+                        <a:t>Host container (routes + layout)</a:t>
+                      </a:r>
+                    </a:p>
+                  </a:txBody>
+                  <a:tcPr anchor="ctr">
+                    <a:lnL>
+                      <a:noFill/>
+                    </a:lnL>
+                    <a:lnR>
+                      <a:noFill/>
+                    </a:lnR>
+                    <a:lnT>
+                      <a:noFill/>
+                    </a:lnT>
+                    <a:lnB>
+                      <a:noFill/>
+                    </a:lnB>
+                    <a:noFill/>
+                  </a:tcPr>
+                </a:tc>
+                <a:extLst>
+                  <a:ext uri="{0D108BD9-81ED-4DB2-BD59-A6C34878D82A}">
+                    <a16:rowId xmlns:a16="http://schemas.microsoft.com/office/drawing/2014/main" val="868070522"/>
+                  </a:ext>
+                </a:extLst>
+              </a:tr>
+              <a:tr h="0">
+                <a:tc>
+                  <a:txBody>
+                    <a:bodyPr/>
+                    <a:lstStyle/>
+                    <a:p>
+                      <a:pPr>
+                        <a:buNone/>
+                      </a:pPr>
+                      <a:r>
+                        <a:rPr lang="en-US"/>
+                        <a:t>User List</a:t>
+                      </a:r>
+                    </a:p>
+                  </a:txBody>
+                  <a:tcPr anchor="ctr">
+                    <a:lnL>
+                      <a:noFill/>
+                    </a:lnL>
+                    <a:lnR>
+                      <a:noFill/>
+                    </a:lnR>
+                    <a:lnT>
+                      <a:noFill/>
+                    </a:lnT>
+                    <a:lnB>
+                      <a:noFill/>
+                    </a:lnB>
+                    <a:noFill/>
+                  </a:tcPr>
+                </a:tc>
+                <a:tc>
+                  <a:txBody>
+                    <a:bodyPr/>
+                    <a:lstStyle/>
+                    <a:p>
+                      <a:pPr>
+                        <a:buNone/>
+                      </a:pPr>
+                      <a:r>
+                        <a:rPr lang="en-US">
+                          <a:latin typeface="Courier New" panose="02070309020205020404" pitchFamily="49" charset="0"/>
+                        </a:rPr>
+                        <a:t>/user-list</a:t>
+                      </a:r>
+                      <a:endParaRPr lang="en-US"/>
+                    </a:p>
+                  </a:txBody>
+                  <a:tcPr anchor="ctr">
+                    <a:lnL>
+                      <a:noFill/>
+                    </a:lnL>
+                    <a:lnR>
+                      <a:noFill/>
+                    </a:lnR>
+                    <a:lnT>
+                      <a:noFill/>
+                    </a:lnT>
+                    <a:lnB>
+                      <a:noFill/>
+                    </a:lnB>
+                    <a:noFill/>
+                  </a:tcPr>
+                </a:tc>
+                <a:tc>
+                  <a:txBody>
+                    <a:bodyPr/>
+                    <a:lstStyle/>
+                    <a:p>
+                      <a:pPr>
+                        <a:buNone/>
+                      </a:pPr>
+                      <a:r>
+                        <a:rPr lang="en-US"/>
+                        <a:t>5001</a:t>
+                      </a:r>
+                    </a:p>
+                  </a:txBody>
+                  <a:tcPr anchor="ctr">
+                    <a:lnL>
+                      <a:noFill/>
+                    </a:lnL>
+                    <a:lnR>
+                      <a:noFill/>
+                    </a:lnR>
+                    <a:lnT>
+                      <a:noFill/>
+                    </a:lnT>
+                    <a:lnB>
+                      <a:noFill/>
+                    </a:lnB>
+                    <a:noFill/>
+                  </a:tcPr>
+                </a:tc>
+                <a:tc>
+                  <a:txBody>
+                    <a:bodyPr/>
+                    <a:lstStyle/>
+                    <a:p>
+                      <a:pPr>
+                        <a:buNone/>
+                      </a:pPr>
+                      <a:r>
+                        <a:rPr lang="en-US"/>
+                        <a:t>Remote micro frontend</a:t>
+                      </a:r>
+                    </a:p>
+                  </a:txBody>
+                  <a:tcPr anchor="ctr">
+                    <a:lnL>
+                      <a:noFill/>
+                    </a:lnL>
+                    <a:lnR>
+                      <a:noFill/>
+                    </a:lnR>
+                    <a:lnT>
+                      <a:noFill/>
+                    </a:lnT>
+                    <a:lnB>
+                      <a:noFill/>
+                    </a:lnB>
+                    <a:noFill/>
+                  </a:tcPr>
+                </a:tc>
+                <a:extLst>
+                  <a:ext uri="{0D108BD9-81ED-4DB2-BD59-A6C34878D82A}">
+                    <a16:rowId xmlns:a16="http://schemas.microsoft.com/office/drawing/2014/main" val="1653202900"/>
+                  </a:ext>
+                </a:extLst>
+              </a:tr>
+              <a:tr h="0">
+                <a:tc>
+                  <a:txBody>
+                    <a:bodyPr/>
+                    <a:lstStyle/>
+                    <a:p>
+                      <a:pPr>
+                        <a:buNone/>
+                      </a:pPr>
+                      <a:r>
+                        <a:rPr lang="en-US"/>
+                        <a:t>User Details</a:t>
+                      </a:r>
+                    </a:p>
+                  </a:txBody>
+                  <a:tcPr anchor="ctr">
+                    <a:lnL>
+                      <a:noFill/>
+                    </a:lnL>
+                    <a:lnR>
+                      <a:noFill/>
+                    </a:lnR>
+                    <a:lnT>
+                      <a:noFill/>
+                    </a:lnT>
+                    <a:lnB>
+                      <a:noFill/>
+                    </a:lnB>
+                    <a:noFill/>
+                  </a:tcPr>
+                </a:tc>
+                <a:tc>
+                  <a:txBody>
+                    <a:bodyPr/>
+                    <a:lstStyle/>
+                    <a:p>
+                      <a:pPr>
+                        <a:buNone/>
+                      </a:pPr>
+                      <a:r>
+                        <a:rPr lang="en-US">
+                          <a:latin typeface="Courier New" panose="02070309020205020404" pitchFamily="49" charset="0"/>
+                        </a:rPr>
+                        <a:t>/user-details</a:t>
+                      </a:r>
+                      <a:endParaRPr lang="en-US"/>
+                    </a:p>
+                  </a:txBody>
+                  <a:tcPr anchor="ctr">
+                    <a:lnL>
+                      <a:noFill/>
+                    </a:lnL>
+                    <a:lnR>
+                      <a:noFill/>
+                    </a:lnR>
+                    <a:lnT>
+                      <a:noFill/>
+                    </a:lnT>
+                    <a:lnB>
+                      <a:noFill/>
+                    </a:lnB>
+                    <a:noFill/>
+                  </a:tcPr>
+                </a:tc>
+                <a:tc>
+                  <a:txBody>
+                    <a:bodyPr/>
+                    <a:lstStyle/>
+                    <a:p>
+                      <a:pPr>
+                        <a:buNone/>
+                      </a:pPr>
+                      <a:r>
+                        <a:rPr lang="en-US"/>
+                        <a:t>5002</a:t>
+                      </a:r>
+                    </a:p>
+                  </a:txBody>
+                  <a:tcPr anchor="ctr">
+                    <a:lnL>
+                      <a:noFill/>
+                    </a:lnL>
+                    <a:lnR>
+                      <a:noFill/>
+                    </a:lnR>
+                    <a:lnT>
+                      <a:noFill/>
+                    </a:lnT>
+                    <a:lnB>
+                      <a:noFill/>
+                    </a:lnB>
+                    <a:noFill/>
+                  </a:tcPr>
+                </a:tc>
+                <a:tc>
+                  <a:txBody>
+                    <a:bodyPr/>
+                    <a:lstStyle/>
+                    <a:p>
+                      <a:pPr>
+                        <a:buNone/>
+                      </a:pPr>
+                      <a:r>
+                        <a:rPr lang="en-US"/>
+                        <a:t>Remote micro frontend</a:t>
+                      </a:r>
+                    </a:p>
+                  </a:txBody>
+                  <a:tcPr anchor="ctr">
+                    <a:lnL>
+                      <a:noFill/>
+                    </a:lnL>
+                    <a:lnR>
+                      <a:noFill/>
+                    </a:lnR>
+                    <a:lnT>
+                      <a:noFill/>
+                    </a:lnT>
+                    <a:lnB>
+                      <a:noFill/>
+                    </a:lnB>
+                    <a:noFill/>
+                  </a:tcPr>
+                </a:tc>
+                <a:extLst>
+                  <a:ext uri="{0D108BD9-81ED-4DB2-BD59-A6C34878D82A}">
+                    <a16:rowId xmlns:a16="http://schemas.microsoft.com/office/drawing/2014/main" val="3310357148"/>
+                  </a:ext>
+                </a:extLst>
+              </a:tr>
+            </a:tbl>
+          </a:graphicData>
+        </a:graphic>
+      </p:graphicFrame>
     </p:spTree>
     <p:extLst>
       <p:ext uri="{BB962C8B-B14F-4D97-AF65-F5344CB8AC3E}">

</xml_diff>